<commit_message>
update info about mid-sem test
</commit_message>
<xml_diff>
--- a/Lectures 2023/CITS5503Storage_week4.pptx
+++ b/Lectures 2023/CITS5503Storage_week4.pptx
@@ -16097,7 +16097,7 @@
             <a:fld id="{B61BEF0D-F0BB-DE4B-95CE-6DB70DBA9567}" type="datetimeFigureOut">
               <a:rPr lang="en-US" smtClean="0"/>
               <a:pPr/>
-              <a:t>8/15/2023</a:t>
+              <a:t>8/16/2023</a:t>
             </a:fld>
             <a:endParaRPr lang="en-US" dirty="0"/>
           </a:p>
@@ -16297,7 +16297,7 @@
             <a:fld id="{B61BEF0D-F0BB-DE4B-95CE-6DB70DBA9567}" type="datetimeFigureOut">
               <a:rPr lang="en-US" smtClean="0"/>
               <a:pPr/>
-              <a:t>8/15/2023</a:t>
+              <a:t>8/16/2023</a:t>
             </a:fld>
             <a:endParaRPr lang="en-US" dirty="0"/>
           </a:p>
@@ -16512,7 +16512,7 @@
             <a:fld id="{B61BEF0D-F0BB-DE4B-95CE-6DB70DBA9567}" type="datetimeFigureOut">
               <a:rPr lang="en-US" smtClean="0"/>
               <a:pPr/>
-              <a:t>8/15/2023</a:t>
+              <a:t>8/16/2023</a:t>
             </a:fld>
             <a:endParaRPr lang="en-US" dirty="0"/>
           </a:p>
@@ -17052,7 +17052,7 @@
             <a:fld id="{B61BEF0D-F0BB-DE4B-95CE-6DB70DBA9567}" type="datetimeFigureOut">
               <a:rPr lang="en-US" smtClean="0"/>
               <a:pPr/>
-              <a:t>8/15/2023</a:t>
+              <a:t>8/16/2023</a:t>
             </a:fld>
             <a:endParaRPr lang="en-US" dirty="0"/>
           </a:p>
@@ -17330,7 +17330,7 @@
             <a:fld id="{B61BEF0D-F0BB-DE4B-95CE-6DB70DBA9567}" type="datetimeFigureOut">
               <a:rPr lang="en-US" smtClean="0"/>
               <a:pPr/>
-              <a:t>8/15/2023</a:t>
+              <a:t>8/16/2023</a:t>
             </a:fld>
             <a:endParaRPr lang="en-US" dirty="0"/>
           </a:p>
@@ -17602,7 +17602,7 @@
             <a:fld id="{B61BEF0D-F0BB-DE4B-95CE-6DB70DBA9567}" type="datetimeFigureOut">
               <a:rPr lang="en-US" smtClean="0"/>
               <a:pPr/>
-              <a:t>8/15/2023</a:t>
+              <a:t>8/16/2023</a:t>
             </a:fld>
             <a:endParaRPr lang="en-US" dirty="0"/>
           </a:p>
@@ -18021,7 +18021,7 @@
             <a:fld id="{B61BEF0D-F0BB-DE4B-95CE-6DB70DBA9567}" type="datetimeFigureOut">
               <a:rPr lang="en-US" smtClean="0"/>
               <a:pPr/>
-              <a:t>8/15/2023</a:t>
+              <a:t>8/16/2023</a:t>
             </a:fld>
             <a:endParaRPr lang="en-US" dirty="0"/>
           </a:p>
@@ -18169,7 +18169,7 @@
             <a:fld id="{B61BEF0D-F0BB-DE4B-95CE-6DB70DBA9567}" type="datetimeFigureOut">
               <a:rPr lang="en-US" smtClean="0"/>
               <a:pPr/>
-              <a:t>8/15/2023</a:t>
+              <a:t>8/16/2023</a:t>
             </a:fld>
             <a:endParaRPr lang="en-US" dirty="0"/>
           </a:p>
@@ -18289,7 +18289,7 @@
             <a:fld id="{B61BEF0D-F0BB-DE4B-95CE-6DB70DBA9567}" type="datetimeFigureOut">
               <a:rPr lang="en-US" smtClean="0"/>
               <a:pPr/>
-              <a:t>8/15/2023</a:t>
+              <a:t>8/16/2023</a:t>
             </a:fld>
             <a:endParaRPr lang="en-US" dirty="0"/>
           </a:p>
@@ -18607,7 +18607,7 @@
             <a:fld id="{B61BEF0D-F0BB-DE4B-95CE-6DB70DBA9567}" type="datetimeFigureOut">
               <a:rPr lang="en-US" smtClean="0"/>
               <a:pPr/>
-              <a:t>8/15/2023</a:t>
+              <a:t>8/16/2023</a:t>
             </a:fld>
             <a:endParaRPr lang="en-US" dirty="0"/>
           </a:p>
@@ -18902,7 +18902,7 @@
             <a:fld id="{B61BEF0D-F0BB-DE4B-95CE-6DB70DBA9567}" type="datetimeFigureOut">
               <a:rPr lang="en-US" smtClean="0"/>
               <a:pPr/>
-              <a:t>8/15/2023</a:t>
+              <a:t>8/16/2023</a:t>
             </a:fld>
             <a:endParaRPr lang="en-US" dirty="0"/>
           </a:p>
@@ -19150,7 +19150,7 @@
             <a:fld id="{B61BEF0D-F0BB-DE4B-95CE-6DB70DBA9567}" type="datetimeFigureOut">
               <a:rPr lang="en-US" smtClean="0"/>
               <a:pPr/>
-              <a:t>8/15/2023</a:t>
+              <a:t>8/16/2023</a:t>
             </a:fld>
             <a:endParaRPr lang="en-US" dirty="0"/>
           </a:p>
@@ -35646,7 +35646,7 @@
           <a:p>
             <a:r>
               <a:rPr lang="en-AU" sz="2800" dirty="0"/>
-              <a:t>The exam is at 3:00pm-4:00pm on 29/08/23.</a:t>
+              <a:t>The exam is at 3:30pm-4:30pm on 29/08/23.</a:t>
             </a:r>
           </a:p>
           <a:p>
@@ -36536,8 +36536,8 @@
         </p:nvSpPr>
         <p:spPr>
           <a:xfrm>
-            <a:off x="556956" y="442501"/>
-            <a:ext cx="3911135" cy="843396"/>
+            <a:off x="556956" y="219984"/>
+            <a:ext cx="3911135" cy="700499"/>
           </a:xfrm>
         </p:spPr>
         <p:txBody>
@@ -36571,7 +36571,7 @@
         </p:nvSpPr>
         <p:spPr>
           <a:xfrm>
-            <a:off x="556956" y="1433945"/>
+            <a:off x="556956" y="1205345"/>
             <a:ext cx="11307942" cy="4732172"/>
           </a:xfrm>
         </p:spPr>
@@ -36583,7 +36583,7 @@
           <a:p>
             <a:r>
               <a:rPr lang="en-AU" sz="2600" dirty="0"/>
-              <a:t>4 lecture slides and 3 labs are assessed.</a:t>
+              <a:t>The first 4 lecture slides and 3 labs are assessed.</a:t>
             </a:r>
           </a:p>
           <a:p>
@@ -36607,6 +36607,13 @@
             <a:r>
               <a:rPr lang="en-AU" sz="2200" dirty="0"/>
               <a:t> </a:t>
+            </a:r>
+          </a:p>
+          <a:p>
+            <a:pPr lvl="1"/>
+            <a:r>
+              <a:rPr lang="en-AU" sz="2200" dirty="0"/>
+              <a:t>5 questions</a:t>
             </a:r>
           </a:p>
           <a:p>

</xml_diff>